<commit_message>
fixup style mistake in Document Principles
</commit_message>
<xml_diff>
--- a/images/PatientManager.pptx
+++ b/images/PatientManager.pptx
@@ -3969,227 +3969,6 @@
       </p:cxnSp>
       <p:sp>
         <p:nvSpPr>
-          <p:cNvPr id="24" name="TextBox 23">
-            <a:extLst>
-              <a:ext uri="{FF2B5EF4-FFF2-40B4-BE49-F238E27FC236}">
-                <a16:creationId xmlns:a16="http://schemas.microsoft.com/office/drawing/2014/main" id="{97BA9DB7-DEDA-4932-8618-FC47D5B1B97E}"/>
-              </a:ext>
-            </a:extLst>
-          </p:cNvPr>
-          <p:cNvSpPr txBox="1"/>
-          <p:nvPr/>
-        </p:nvSpPr>
-        <p:spPr>
-          <a:xfrm>
-            <a:off x="6687773" y="3181405"/>
-            <a:ext cx="2099589" cy="523220"/>
-          </a:xfrm>
-          <a:prstGeom prst="rect">
-            <a:avLst/>
-          </a:prstGeom>
-          <a:solidFill>
-            <a:schemeClr val="accent1">
-              <a:alpha val="50000"/>
-            </a:schemeClr>
-          </a:solidFill>
-          <a:ln>
-            <a:noFill/>
-          </a:ln>
-        </p:spPr>
-        <p:style>
-          <a:lnRef idx="0">
-            <a:scrgbClr r="0" g="0" b="0"/>
-          </a:lnRef>
-          <a:fillRef idx="0">
-            <a:scrgbClr r="0" g="0" b="0"/>
-          </a:fillRef>
-          <a:effectRef idx="0">
-            <a:scrgbClr r="0" g="0" b="0"/>
-          </a:effectRef>
-          <a:fontRef idx="minor">
-            <a:schemeClr val="lt1"/>
-          </a:fontRef>
-        </p:style>
-        <p:txBody>
-          <a:bodyPr wrap="square" rtlCol="0">
-            <a:spAutoFit/>
-          </a:bodyPr>
-          <a:lstStyle/>
-          <a:p>
-            <a:pPr algn="ctr"/>
-            <a:r>
-              <a:rPr lang="en-US" sz="1400" b="1" dirty="0">
-                <a:solidFill>
-                  <a:schemeClr val="tx1"/>
-                </a:solidFill>
-              </a:rPr>
-              <a:t>Feed updates to 3562A </a:t>
-            </a:r>
-          </a:p>
-          <a:p>
-            <a:pPr algn="ctr"/>
-            <a:r>
-              <a:rPr lang="en-US" sz="1400" b="1" dirty="0">
-                <a:solidFill>
-                  <a:schemeClr val="tx1"/>
-                </a:solidFill>
-              </a:rPr>
-              <a:t>Gary Collins</a:t>
-            </a:r>
-            <a:endParaRPr lang="en-US" sz="1400" b="1" i="1" dirty="0">
-              <a:solidFill>
-                <a:schemeClr val="tx1"/>
-              </a:solidFill>
-            </a:endParaRPr>
-          </a:p>
-        </p:txBody>
-      </p:sp>
-      <p:sp>
-        <p:nvSpPr>
-          <p:cNvPr id="25" name="TextBox 24">
-            <a:extLst>
-              <a:ext uri="{FF2B5EF4-FFF2-40B4-BE49-F238E27FC236}">
-                <a16:creationId xmlns:a16="http://schemas.microsoft.com/office/drawing/2014/main" id="{D25E81B9-B6D9-4088-8C68-ABE40CE23FD2}"/>
-              </a:ext>
-            </a:extLst>
-          </p:cNvPr>
-          <p:cNvSpPr txBox="1"/>
-          <p:nvPr/>
-        </p:nvSpPr>
-        <p:spPr>
-          <a:xfrm>
-            <a:off x="1025916" y="3165398"/>
-            <a:ext cx="2575601" cy="523220"/>
-          </a:xfrm>
-          <a:prstGeom prst="rect">
-            <a:avLst/>
-          </a:prstGeom>
-          <a:solidFill>
-            <a:schemeClr val="accent1">
-              <a:alpha val="50000"/>
-            </a:schemeClr>
-          </a:solidFill>
-          <a:ln>
-            <a:noFill/>
-          </a:ln>
-        </p:spPr>
-        <p:style>
-          <a:lnRef idx="0">
-            <a:scrgbClr r="0" g="0" b="0"/>
-          </a:lnRef>
-          <a:fillRef idx="0">
-            <a:scrgbClr r="0" g="0" b="0"/>
-          </a:fillRef>
-          <a:effectRef idx="0">
-            <a:scrgbClr r="0" g="0" b="0"/>
-          </a:effectRef>
-          <a:fontRef idx="minor">
-            <a:schemeClr val="lt1"/>
-          </a:fontRef>
-        </p:style>
-        <p:txBody>
-          <a:bodyPr wrap="square" rtlCol="0">
-            <a:spAutoFit/>
-          </a:bodyPr>
-          <a:lstStyle/>
-          <a:p>
-            <a:pPr algn="ctr"/>
-            <a:r>
-              <a:rPr lang="en-US" sz="1400" b="1" dirty="0">
-                <a:solidFill>
-                  <a:schemeClr val="tx1"/>
-                </a:solidFill>
-              </a:rPr>
-              <a:t>Feed updates to 0320 </a:t>
-            </a:r>
-          </a:p>
-          <a:p>
-            <a:pPr algn="ctr"/>
-            <a:r>
-              <a:rPr lang="en-US" sz="1400" b="1" dirty="0">
-                <a:solidFill>
-                  <a:schemeClr val="tx1"/>
-                </a:solidFill>
-              </a:rPr>
-              <a:t>Gary Collins</a:t>
-            </a:r>
-          </a:p>
-        </p:txBody>
-      </p:sp>
-      <p:sp>
-        <p:nvSpPr>
-          <p:cNvPr id="34" name="TextBox 33">
-            <a:extLst>
-              <a:ext uri="{FF2B5EF4-FFF2-40B4-BE49-F238E27FC236}">
-                <a16:creationId xmlns:a16="http://schemas.microsoft.com/office/drawing/2014/main" id="{A28C6198-73FD-4A35-BFC1-6A4EC78CBAA3}"/>
-              </a:ext>
-            </a:extLst>
-          </p:cNvPr>
-          <p:cNvSpPr txBox="1"/>
-          <p:nvPr/>
-        </p:nvSpPr>
-        <p:spPr>
-          <a:xfrm>
-            <a:off x="3902688" y="3178307"/>
-            <a:ext cx="2575601" cy="523220"/>
-          </a:xfrm>
-          <a:prstGeom prst="rect">
-            <a:avLst/>
-          </a:prstGeom>
-          <a:solidFill>
-            <a:schemeClr val="accent1">
-              <a:alpha val="50000"/>
-            </a:schemeClr>
-          </a:solidFill>
-          <a:ln>
-            <a:noFill/>
-          </a:ln>
-        </p:spPr>
-        <p:style>
-          <a:lnRef idx="0">
-            <a:scrgbClr r="0" g="0" b="0"/>
-          </a:lnRef>
-          <a:fillRef idx="0">
-            <a:scrgbClr r="0" g="0" b="0"/>
-          </a:fillRef>
-          <a:effectRef idx="0">
-            <a:scrgbClr r="0" g="0" b="0"/>
-          </a:effectRef>
-          <a:fontRef idx="minor">
-            <a:schemeClr val="lt1"/>
-          </a:fontRef>
-        </p:style>
-        <p:txBody>
-          <a:bodyPr wrap="square" rtlCol="0">
-            <a:spAutoFit/>
-          </a:bodyPr>
-          <a:lstStyle/>
-          <a:p>
-            <a:pPr algn="ctr"/>
-            <a:r>
-              <a:rPr lang="en-US" sz="1400" b="1" dirty="0">
-                <a:solidFill>
-                  <a:schemeClr val="tx1"/>
-                </a:solidFill>
-              </a:rPr>
-              <a:t>Feed updates to 333 </a:t>
-            </a:r>
-          </a:p>
-          <a:p>
-            <a:pPr algn="ctr"/>
-            <a:r>
-              <a:rPr lang="en-US" sz="1400" b="1" dirty="0">
-                <a:solidFill>
-                  <a:schemeClr val="tx1"/>
-                </a:solidFill>
-              </a:rPr>
-              <a:t>Gary Collin</a:t>
-            </a:r>
-          </a:p>
-        </p:txBody>
-      </p:sp>
-      <p:sp>
-        <p:nvSpPr>
           <p:cNvPr id="26" name="Rectangle: Folded Corner 25">
             <a:extLst>
               <a:ext uri="{FF2B5EF4-FFF2-40B4-BE49-F238E27FC236}">
@@ -4472,6 +4251,227 @@
           </a:fontRef>
         </p:style>
       </p:cxnSp>
+      <p:sp>
+        <p:nvSpPr>
+          <p:cNvPr id="24" name="TextBox 23">
+            <a:extLst>
+              <a:ext uri="{FF2B5EF4-FFF2-40B4-BE49-F238E27FC236}">
+                <a16:creationId xmlns:a16="http://schemas.microsoft.com/office/drawing/2014/main" id="{97BA9DB7-DEDA-4932-8618-FC47D5B1B97E}"/>
+              </a:ext>
+            </a:extLst>
+          </p:cNvPr>
+          <p:cNvSpPr txBox="1"/>
+          <p:nvPr/>
+        </p:nvSpPr>
+        <p:spPr>
+          <a:xfrm>
+            <a:off x="6687773" y="3181405"/>
+            <a:ext cx="2099589" cy="523220"/>
+          </a:xfrm>
+          <a:prstGeom prst="rect">
+            <a:avLst/>
+          </a:prstGeom>
+          <a:solidFill>
+            <a:schemeClr val="accent1">
+              <a:alpha val="93000"/>
+            </a:schemeClr>
+          </a:solidFill>
+          <a:ln>
+            <a:noFill/>
+          </a:ln>
+        </p:spPr>
+        <p:style>
+          <a:lnRef idx="0">
+            <a:scrgbClr r="0" g="0" b="0"/>
+          </a:lnRef>
+          <a:fillRef idx="0">
+            <a:scrgbClr r="0" g="0" b="0"/>
+          </a:fillRef>
+          <a:effectRef idx="0">
+            <a:scrgbClr r="0" g="0" b="0"/>
+          </a:effectRef>
+          <a:fontRef idx="minor">
+            <a:schemeClr val="lt1"/>
+          </a:fontRef>
+        </p:style>
+        <p:txBody>
+          <a:bodyPr wrap="square" rtlCol="0">
+            <a:spAutoFit/>
+          </a:bodyPr>
+          <a:lstStyle/>
+          <a:p>
+            <a:pPr algn="ctr"/>
+            <a:r>
+              <a:rPr lang="en-US" sz="1400" b="1" dirty="0">
+                <a:solidFill>
+                  <a:schemeClr val="tx1"/>
+                </a:solidFill>
+              </a:rPr>
+              <a:t>Feed updates to 3562A </a:t>
+            </a:r>
+          </a:p>
+          <a:p>
+            <a:pPr algn="ctr"/>
+            <a:r>
+              <a:rPr lang="en-US" sz="1400" b="1" dirty="0">
+                <a:solidFill>
+                  <a:schemeClr val="tx1"/>
+                </a:solidFill>
+              </a:rPr>
+              <a:t>Gary Collins</a:t>
+            </a:r>
+            <a:endParaRPr lang="en-US" sz="1400" b="1" i="1" dirty="0">
+              <a:solidFill>
+                <a:schemeClr val="tx1"/>
+              </a:solidFill>
+            </a:endParaRPr>
+          </a:p>
+        </p:txBody>
+      </p:sp>
+      <p:sp>
+        <p:nvSpPr>
+          <p:cNvPr id="25" name="TextBox 24">
+            <a:extLst>
+              <a:ext uri="{FF2B5EF4-FFF2-40B4-BE49-F238E27FC236}">
+                <a16:creationId xmlns:a16="http://schemas.microsoft.com/office/drawing/2014/main" id="{D25E81B9-B6D9-4088-8C68-ABE40CE23FD2}"/>
+              </a:ext>
+            </a:extLst>
+          </p:cNvPr>
+          <p:cNvSpPr txBox="1"/>
+          <p:nvPr/>
+        </p:nvSpPr>
+        <p:spPr>
+          <a:xfrm>
+            <a:off x="1025916" y="3165398"/>
+            <a:ext cx="2575601" cy="523220"/>
+          </a:xfrm>
+          <a:prstGeom prst="rect">
+            <a:avLst/>
+          </a:prstGeom>
+          <a:solidFill>
+            <a:schemeClr val="accent1">
+              <a:alpha val="93000"/>
+            </a:schemeClr>
+          </a:solidFill>
+          <a:ln>
+            <a:noFill/>
+          </a:ln>
+        </p:spPr>
+        <p:style>
+          <a:lnRef idx="0">
+            <a:scrgbClr r="0" g="0" b="0"/>
+          </a:lnRef>
+          <a:fillRef idx="0">
+            <a:scrgbClr r="0" g="0" b="0"/>
+          </a:fillRef>
+          <a:effectRef idx="0">
+            <a:scrgbClr r="0" g="0" b="0"/>
+          </a:effectRef>
+          <a:fontRef idx="minor">
+            <a:schemeClr val="lt1"/>
+          </a:fontRef>
+        </p:style>
+        <p:txBody>
+          <a:bodyPr wrap="square" rtlCol="0">
+            <a:spAutoFit/>
+          </a:bodyPr>
+          <a:lstStyle/>
+          <a:p>
+            <a:pPr algn="ctr"/>
+            <a:r>
+              <a:rPr lang="en-US" sz="1400" b="1" dirty="0">
+                <a:solidFill>
+                  <a:schemeClr val="tx1"/>
+                </a:solidFill>
+              </a:rPr>
+              <a:t>Feed updates to 0320 </a:t>
+            </a:r>
+          </a:p>
+          <a:p>
+            <a:pPr algn="ctr"/>
+            <a:r>
+              <a:rPr lang="en-US" sz="1400" b="1" dirty="0">
+                <a:solidFill>
+                  <a:schemeClr val="tx1"/>
+                </a:solidFill>
+              </a:rPr>
+              <a:t>Gary Collins</a:t>
+            </a:r>
+          </a:p>
+        </p:txBody>
+      </p:sp>
+      <p:sp>
+        <p:nvSpPr>
+          <p:cNvPr id="34" name="TextBox 33">
+            <a:extLst>
+              <a:ext uri="{FF2B5EF4-FFF2-40B4-BE49-F238E27FC236}">
+                <a16:creationId xmlns:a16="http://schemas.microsoft.com/office/drawing/2014/main" id="{A28C6198-73FD-4A35-BFC1-6A4EC78CBAA3}"/>
+              </a:ext>
+            </a:extLst>
+          </p:cNvPr>
+          <p:cNvSpPr txBox="1"/>
+          <p:nvPr/>
+        </p:nvSpPr>
+        <p:spPr>
+          <a:xfrm>
+            <a:off x="3902688" y="3178307"/>
+            <a:ext cx="2575601" cy="523220"/>
+          </a:xfrm>
+          <a:prstGeom prst="rect">
+            <a:avLst/>
+          </a:prstGeom>
+          <a:solidFill>
+            <a:schemeClr val="accent1">
+              <a:alpha val="93000"/>
+            </a:schemeClr>
+          </a:solidFill>
+          <a:ln>
+            <a:noFill/>
+          </a:ln>
+        </p:spPr>
+        <p:style>
+          <a:lnRef idx="0">
+            <a:scrgbClr r="0" g="0" b="0"/>
+          </a:lnRef>
+          <a:fillRef idx="0">
+            <a:scrgbClr r="0" g="0" b="0"/>
+          </a:fillRef>
+          <a:effectRef idx="0">
+            <a:scrgbClr r="0" g="0" b="0"/>
+          </a:effectRef>
+          <a:fontRef idx="minor">
+            <a:schemeClr val="lt1"/>
+          </a:fontRef>
+        </p:style>
+        <p:txBody>
+          <a:bodyPr wrap="square" rtlCol="0">
+            <a:spAutoFit/>
+          </a:bodyPr>
+          <a:lstStyle/>
+          <a:p>
+            <a:pPr algn="ctr"/>
+            <a:r>
+              <a:rPr lang="en-US" sz="1400" b="1" dirty="0">
+                <a:solidFill>
+                  <a:schemeClr val="tx1"/>
+                </a:solidFill>
+              </a:rPr>
+              <a:t>Feed updates to 333 </a:t>
+            </a:r>
+          </a:p>
+          <a:p>
+            <a:pPr algn="ctr"/>
+            <a:r>
+              <a:rPr lang="en-US" sz="1400" b="1" dirty="0">
+                <a:solidFill>
+                  <a:schemeClr val="tx1"/>
+                </a:solidFill>
+              </a:rPr>
+              <a:t>Gary Collin</a:t>
+            </a:r>
+          </a:p>
+        </p:txBody>
+      </p:sp>
     </p:spTree>
     <p:extLst>
       <p:ext uri="{BB962C8B-B14F-4D97-AF65-F5344CB8AC3E}">

</xml_diff>